<commit_message>
Added last slide to ppt and link and QR code to first slide
</commit_message>
<xml_diff>
--- a/USCOTS 2025 SCORE Breakout.pptx
+++ b/USCOTS 2025 SCORE Breakout.pptx
@@ -18,6 +18,7 @@
     <p:sldId id="287" r:id="rId12"/>
     <p:sldId id="288" r:id="rId13"/>
     <p:sldId id="289" r:id="rId14"/>
+    <p:sldId id="290" r:id="rId15"/>
   </p:sldIdLst>
   <p:sldSz cx="9144000" cy="5143500" type="screen16x9"/>
   <p:notesSz cx="9144000" cy="5143500"/>
@@ -1340,7 +1341,7 @@
         </p:blipFill>
         <p:spPr>
           <a:xfrm>
-            <a:off x="2514600" y="2661980"/>
+            <a:off x="2514600" y="2114550"/>
             <a:ext cx="3465599" cy="2092200"/>
           </a:xfrm>
           <a:prstGeom prst="rect">
@@ -1721,6 +1722,81 @@
           </a:p>
         </p:txBody>
       </p:sp>
+      <p:sp>
+        <p:nvSpPr>
+          <p:cNvPr id="5" name="TextBox 4">
+            <a:extLst>
+              <a:ext uri="{FF2B5EF4-FFF2-40B4-BE49-F238E27FC236}">
+                <a16:creationId xmlns:a16="http://schemas.microsoft.com/office/drawing/2014/main" id="{863512FB-1337-8205-84A4-72C7C86EA337}"/>
+              </a:ext>
+            </a:extLst>
+          </p:cNvPr>
+          <p:cNvSpPr txBox="1"/>
+          <p:nvPr/>
+        </p:nvSpPr>
+        <p:spPr>
+          <a:xfrm>
+            <a:off x="304800" y="4085440"/>
+            <a:ext cx="5867400" cy="646331"/>
+          </a:xfrm>
+          <a:prstGeom prst="rect">
+            <a:avLst/>
+          </a:prstGeom>
+          <a:noFill/>
+        </p:spPr>
+        <p:txBody>
+          <a:bodyPr wrap="square" rtlCol="0">
+            <a:spAutoFit/>
+          </a:bodyPr>
+          <a:lstStyle/>
+          <a:p>
+            <a:r>
+              <a:rPr lang="en-US" dirty="0"/>
+              <a:t>Outline for the session: </a:t>
+            </a:r>
+            <a:r>
+              <a:rPr lang="en-US" dirty="0">
+                <a:hlinkClick r:id="rId3"/>
+              </a:rPr>
+              <a:t>https://github.com/iramler/score_uscots_2025_breakout</a:t>
+            </a:r>
+            <a:r>
+              <a:rPr lang="en-US" dirty="0"/>
+              <a:t>  </a:t>
+            </a:r>
+          </a:p>
+        </p:txBody>
+      </p:sp>
+      <p:pic>
+        <p:nvPicPr>
+          <p:cNvPr id="7" name="Picture 6">
+            <a:extLst>
+              <a:ext uri="{FF2B5EF4-FFF2-40B4-BE49-F238E27FC236}">
+                <a16:creationId xmlns:a16="http://schemas.microsoft.com/office/drawing/2014/main" id="{B546B8D6-7E5D-94D8-C985-983568B66467}"/>
+              </a:ext>
+            </a:extLst>
+          </p:cNvPr>
+          <p:cNvPicPr>
+            <a:picLocks noChangeAspect="1"/>
+          </p:cNvPicPr>
+          <p:nvPr/>
+        </p:nvPicPr>
+        <p:blipFill>
+          <a:blip r:embed="rId4"/>
+          <a:stretch>
+            <a:fillRect/>
+          </a:stretch>
+        </p:blipFill>
+        <p:spPr>
+          <a:xfrm>
+            <a:off x="6553200" y="2860379"/>
+            <a:ext cx="2155224" cy="2155224"/>
+          </a:xfrm>
+          <a:prstGeom prst="rect">
+            <a:avLst/>
+          </a:prstGeom>
+        </p:spPr>
+      </p:pic>
     </p:spTree>
   </p:cSld>
   <p:clrMapOvr>
@@ -2729,6 +2805,135 @@
     <p:extLst>
       <p:ext uri="{BB962C8B-B14F-4D97-AF65-F5344CB8AC3E}">
         <p14:creationId xmlns:p14="http://schemas.microsoft.com/office/powerpoint/2010/main" val="3838682028"/>
+      </p:ext>
+    </p:extLst>
+  </p:cSld>
+  <p:clrMapOvr>
+    <a:masterClrMapping/>
+  </p:clrMapOvr>
+</p:sld>
+</file>
+
+<file path=ppt/slides/slide14.xml><?xml version="1.0" encoding="utf-8"?>
+<p:sld xmlns:a="http://schemas.openxmlformats.org/drawingml/2006/main" xmlns:r="http://schemas.openxmlformats.org/officeDocument/2006/relationships" xmlns:p="http://schemas.openxmlformats.org/presentationml/2006/main">
+  <p:cSld>
+    <p:spTree>
+      <p:nvGrpSpPr>
+        <p:cNvPr id="1" name=""/>
+        <p:cNvGrpSpPr/>
+        <p:nvPr/>
+      </p:nvGrpSpPr>
+      <p:grpSpPr>
+        <a:xfrm>
+          <a:off x="0" y="0"/>
+          <a:ext cx="0" cy="0"/>
+          <a:chOff x="0" y="0"/>
+          <a:chExt cx="0" cy="0"/>
+        </a:xfrm>
+      </p:grpSpPr>
+      <p:sp>
+        <p:nvSpPr>
+          <p:cNvPr id="2" name="Title 1">
+            <a:extLst>
+              <a:ext uri="{FF2B5EF4-FFF2-40B4-BE49-F238E27FC236}">
+                <a16:creationId xmlns:a16="http://schemas.microsoft.com/office/drawing/2014/main" id="{E0008187-B351-8466-31B8-509A33CC3C73}"/>
+              </a:ext>
+            </a:extLst>
+          </p:cNvPr>
+          <p:cNvSpPr>
+            <a:spLocks noGrp="1"/>
+          </p:cNvSpPr>
+          <p:nvPr>
+            <p:ph type="title"/>
+          </p:nvPr>
+        </p:nvSpPr>
+        <p:spPr>
+          <a:xfrm>
+            <a:off x="530225" y="373126"/>
+            <a:ext cx="6632575" cy="861774"/>
+          </a:xfrm>
+        </p:spPr>
+        <p:txBody>
+          <a:bodyPr/>
+          <a:lstStyle/>
+          <a:p>
+            <a:r>
+              <a:rPr lang="en-US" dirty="0"/>
+              <a:t>Want to Get More Involved with SCORE?</a:t>
+            </a:r>
+          </a:p>
+        </p:txBody>
+      </p:sp>
+      <p:sp>
+        <p:nvSpPr>
+          <p:cNvPr id="3" name="Text Placeholder 2">
+            <a:extLst>
+              <a:ext uri="{FF2B5EF4-FFF2-40B4-BE49-F238E27FC236}">
+                <a16:creationId xmlns:a16="http://schemas.microsoft.com/office/drawing/2014/main" id="{48DFF6F6-945B-2487-CD5F-2370C34C91CF}"/>
+              </a:ext>
+            </a:extLst>
+          </p:cNvPr>
+          <p:cNvSpPr>
+            <a:spLocks noGrp="1"/>
+          </p:cNvSpPr>
+          <p:nvPr>
+            <p:ph type="body" idx="1"/>
+          </p:nvPr>
+        </p:nvSpPr>
+        <p:spPr>
+          <a:xfrm>
+            <a:off x="2514600" y="817914"/>
+            <a:ext cx="3886200" cy="1107996"/>
+          </a:xfrm>
+        </p:spPr>
+        <p:txBody>
+          <a:bodyPr/>
+          <a:lstStyle/>
+          <a:p>
+            <a:r>
+              <a:rPr lang="en-US" sz="3600" dirty="0">
+                <a:hlinkClick r:id="rId2"/>
+              </a:rPr>
+              <a:t>Join the Network!</a:t>
+            </a:r>
+            <a:endParaRPr lang="en-US" sz="3600" dirty="0"/>
+          </a:p>
+        </p:txBody>
+      </p:sp>
+      <p:pic>
+        <p:nvPicPr>
+          <p:cNvPr id="5" name="Picture 4">
+            <a:extLst>
+              <a:ext uri="{FF2B5EF4-FFF2-40B4-BE49-F238E27FC236}">
+                <a16:creationId xmlns:a16="http://schemas.microsoft.com/office/drawing/2014/main" id="{8F19374D-48C3-99EC-ADFC-B403DF336B74}"/>
+              </a:ext>
+            </a:extLst>
+          </p:cNvPr>
+          <p:cNvPicPr>
+            <a:picLocks noChangeAspect="1"/>
+          </p:cNvPicPr>
+          <p:nvPr/>
+        </p:nvPicPr>
+        <p:blipFill>
+          <a:blip r:embed="rId3"/>
+          <a:stretch>
+            <a:fillRect/>
+          </a:stretch>
+        </p:blipFill>
+        <p:spPr>
+          <a:xfrm>
+            <a:off x="1904999" y="1371912"/>
+            <a:ext cx="5018199" cy="3866838"/>
+          </a:xfrm>
+          <a:prstGeom prst="rect">
+            <a:avLst/>
+          </a:prstGeom>
+        </p:spPr>
+      </p:pic>
+    </p:spTree>
+    <p:extLst>
+      <p:ext uri="{BB962C8B-B14F-4D97-AF65-F5344CB8AC3E}">
+        <p14:creationId xmlns:p14="http://schemas.microsoft.com/office/powerpoint/2010/main" val="1031647841"/>
       </p:ext>
     </p:extLst>
   </p:cSld>

</xml_diff>

<commit_message>
fixed missing ) in pptx
</commit_message>
<xml_diff>
--- a/USCOTS 2025 SCORE Breakout.pptx
+++ b/USCOTS 2025 SCORE Breakout.pptx
@@ -4210,14 +4210,14 @@
               <a:t> </a:t>
             </a:r>
             <a:r>
-              <a:rPr lang="en-US" sz="2400" spc="-20" dirty="0">
-                <a:solidFill>
-                  <a:srgbClr val="595959"/>
-                </a:solidFill>
-                <a:latin typeface="Arial"/>
-                <a:cs typeface="Arial"/>
-              </a:rPr>
-              <a:t>(usually </a:t>
+              <a:rPr lang="en-US" sz="2400" spc="-20">
+                <a:solidFill>
+                  <a:srgbClr val="595959"/>
+                </a:solidFill>
+                <a:latin typeface="Arial"/>
+                <a:cs typeface="Arial"/>
+              </a:rPr>
+              <a:t>(usually) </a:t>
             </a:r>
             <a:r>
               <a:rPr sz="2400" spc="-10" dirty="0">

</xml_diff>